<commit_message>
More info on Team Scrapy
</commit_message>
<xml_diff>
--- a/Team Scrapy - Premiere Project - Adult Income Prediction/HDSC Fall'22 Team Scrapy - Project Presentation.pptx
+++ b/Team Scrapy - Premiere Project - Adult Income Prediction/HDSC Fall'22 Team Scrapy - Project Presentation.pptx
@@ -5455,7 +5455,7 @@
               <a:t>Adelusi</a:t>
             </a:r>
             <a:r>
-              <a:rPr lang="en-GB" sz="2000">
+              <a:rPr lang="en-GB" sz="2000" dirty="0">
                 <a:latin typeface="Tahoma" panose="020B0604030504040204" pitchFamily="34" charset="0"/>
                 <a:ea typeface="Tahoma" panose="020B0604030504040204" pitchFamily="34" charset="0"/>
                 <a:cs typeface="Tahoma" panose="020B0604030504040204" pitchFamily="34" charset="0"/>
@@ -5638,13 +5638,18 @@
           </a:p>
           <a:p>
             <a:r>
-              <a:rPr lang="en-GB" sz="2000" dirty="0">
-                <a:latin typeface="Tahoma" panose="020B0604030504040204" pitchFamily="34" charset="0"/>
-                <a:ea typeface="Tahoma" panose="020B0604030504040204" pitchFamily="34" charset="0"/>
-                <a:cs typeface="Tahoma" panose="020B0604030504040204" pitchFamily="34" charset="0"/>
-              </a:rPr>
-              <a:t>Ugo Chukwu</a:t>
-            </a:r>
+              <a:rPr lang="en-GB" sz="2000">
+                <a:latin typeface="Tahoma" panose="020B0604030504040204" pitchFamily="34" charset="0"/>
+                <a:ea typeface="Tahoma" panose="020B0604030504040204" pitchFamily="34" charset="0"/>
+                <a:cs typeface="Tahoma" panose="020B0604030504040204" pitchFamily="34" charset="0"/>
+              </a:rPr>
+              <a:t>Barry Ugochukwu</a:t>
+            </a:r>
+            <a:endParaRPr lang="en-GB" sz="2000" dirty="0">
+              <a:latin typeface="Tahoma" panose="020B0604030504040204" pitchFamily="34" charset="0"/>
+              <a:ea typeface="Tahoma" panose="020B0604030504040204" pitchFamily="34" charset="0"/>
+              <a:cs typeface="Tahoma" panose="020B0604030504040204" pitchFamily="34" charset="0"/>
+            </a:endParaRPr>
           </a:p>
         </p:txBody>
       </p:sp>

</xml_diff>